<commit_message>
Minor updates from reviews
</commit_message>
<xml_diff>
--- a/specs/config/Resources/OSLC change set delivery.pptx
+++ b/specs/config/Resources/OSLC change set delivery.pptx
@@ -222,7 +222,7 @@
           <a:p>
             <a:fld id="{AC64624D-466C-2042-8A0A-5AA56DE2DC64}" type="datetimeFigureOut">
               <a:rPr lang="en-US" smtClean="0"/>
-              <a:t>2/5/24</a:t>
+              <a:t>8/16/24</a:t>
             </a:fld>
             <a:endParaRPr lang="en-US" dirty="0"/>
           </a:p>
@@ -387,7 +387,7 @@
           <a:p>
             <a:fld id="{A760D7BC-41EB-DC45-939C-558E874D2743}" type="datetimeFigureOut">
               <a:rPr lang="en-US" smtClean="0"/>
-              <a:t>2/5/24</a:t>
+              <a:t>8/16/24</a:t>
             </a:fld>
             <a:endParaRPr lang="en-US" dirty="0"/>
           </a:p>
@@ -9905,7 +9905,7 @@
           <a:p>
             <a:fld id="{5D54C85F-E49F-4556-9C13-BAF2023328F7}" type="datetime1">
               <a:rPr lang="en-US" smtClean="0"/>
-              <a:t>2/5/24</a:t>
+              <a:t>8/16/24</a:t>
             </a:fld>
             <a:endParaRPr lang="en-US" dirty="0"/>
           </a:p>
@@ -10667,7 +10667,7 @@
           <a:p>
             <a:fld id="{96AFE3AB-9457-47E2-8F5A-309AE593D110}" type="datetime1">
               <a:rPr lang="en-US" smtClean="0"/>
-              <a:t>2/5/24</a:t>
+              <a:t>8/16/24</a:t>
             </a:fld>
             <a:endParaRPr lang="en-US" dirty="0"/>
           </a:p>
@@ -10968,7 +10968,7 @@
           <a:p>
             <a:fld id="{2674E2BE-0B60-42EC-99E3-1496BB98F673}" type="datetime1">
               <a:rPr lang="en-US" smtClean="0"/>
-              <a:t>2/5/24</a:t>
+              <a:t>8/16/24</a:t>
             </a:fld>
             <a:endParaRPr lang="en-US" dirty="0"/>
           </a:p>
@@ -11286,7 +11286,7 @@
           <a:p>
             <a:fld id="{5041C711-DA90-4286-A3E2-176F296CDBB6}" type="datetime1">
               <a:rPr lang="en-US" smtClean="0"/>
-              <a:t>2/5/24</a:t>
+              <a:t>8/16/24</a:t>
             </a:fld>
             <a:endParaRPr lang="en-US" dirty="0"/>
           </a:p>
@@ -11513,7 +11513,7 @@
           <a:p>
             <a:fld id="{AA52A885-0CA1-4F08-B373-9D4765BA07FF}" type="datetime1">
               <a:rPr lang="en-US" smtClean="0"/>
-              <a:t>2/5/24</a:t>
+              <a:t>8/16/24</a:t>
             </a:fld>
             <a:endParaRPr lang="en-US" dirty="0"/>
           </a:p>
@@ -11922,7 +11922,7 @@
           <a:p>
             <a:fld id="{1C8FD8CA-192E-4293-A4D2-891F0932AEDF}" type="datetime1">
               <a:rPr lang="en-US" smtClean="0"/>
-              <a:t>2/5/24</a:t>
+              <a:t>8/16/24</a:t>
             </a:fld>
             <a:endParaRPr lang="en-US" dirty="0"/>
           </a:p>
@@ -12066,7 +12066,7 @@
           <a:p>
             <a:fld id="{F6C5EABC-B859-4AFC-A225-1E2F4D4B4664}" type="datetime1">
               <a:rPr lang="en-US" smtClean="0"/>
-              <a:t>2/5/24</a:t>
+              <a:t>8/16/24</a:t>
             </a:fld>
             <a:endParaRPr lang="en-US" dirty="0"/>
           </a:p>
@@ -14922,7 +14922,7 @@
           <a:p>
             <a:fld id="{2674E2BE-0B60-42EC-99E3-1496BB98F673}" type="datetime1">
               <a:rPr lang="en-US" smtClean="0"/>
-              <a:t>2/5/24</a:t>
+              <a:t>8/16/24</a:t>
             </a:fld>
             <a:endParaRPr lang="en-US" dirty="0"/>
           </a:p>
@@ -17965,7 +17965,7 @@
           <a:p>
             <a:fld id="{F988DFB2-08C0-47EE-9E2D-C36FBBC14812}" type="datetime1">
               <a:rPr lang="en-US" smtClean="0"/>
-              <a:t>2/5/24</a:t>
+              <a:t>8/16/24</a:t>
             </a:fld>
             <a:endParaRPr lang="en-US" dirty="0"/>
           </a:p>
@@ -18335,7 +18335,7 @@
           <a:p>
             <a:fld id="{6AA09E7F-3822-4A7A-A3F2-AA6777F1B30F}" type="datetime1">
               <a:rPr lang="en-US" smtClean="0"/>
-              <a:t>2/5/24</a:t>
+              <a:t>8/16/24</a:t>
             </a:fld>
             <a:endParaRPr lang="en-US" dirty="0"/>
           </a:p>
@@ -18560,7 +18560,7 @@
           <a:p>
             <a:fld id="{1B003211-AD61-4E7C-9A84-FA9708692C37}" type="datetime1">
               <a:rPr lang="en-US" smtClean="0"/>
-              <a:t>2/5/24</a:t>
+              <a:t>8/16/24</a:t>
             </a:fld>
             <a:endParaRPr lang="en-US" dirty="0"/>
           </a:p>
@@ -18986,7 +18986,7 @@
           <a:p>
             <a:fld id="{B5C78C4C-056F-4AFF-BFF7-E831EDFABF3A}" type="datetime1">
               <a:rPr lang="en-US" smtClean="0"/>
-              <a:t>2/5/24</a:t>
+              <a:t>8/16/24</a:t>
             </a:fld>
             <a:endParaRPr lang="en-US" dirty="0"/>
           </a:p>
@@ -41753,7 +41753,27 @@
                 <a:effectLst/>
                 <a:latin typeface="Calibri" panose="020F0502020204030204" pitchFamily="34" charset="0"/>
               </a:rPr>
-              <a:t>delivery is effected by creating a delivery rather than creating a transient delivery session and then doing a GET+PUT on it</a:t>
+              <a:t>delivery </a:t>
+            </a:r>
+            <a:r>
+              <a:rPr lang="en-US" sz="1800" b="0" i="0" u="none" strike="noStrike">
+                <a:solidFill>
+                  <a:srgbClr val="000000"/>
+                </a:solidFill>
+                <a:effectLst/>
+                <a:latin typeface="Calibri" panose="020F0502020204030204" pitchFamily="34" charset="0"/>
+              </a:rPr>
+              <a:t>is affected </a:t>
+            </a:r>
+            <a:r>
+              <a:rPr lang="en-US" sz="1800" b="0" i="0" u="none" strike="noStrike" dirty="0">
+                <a:solidFill>
+                  <a:srgbClr val="000000"/>
+                </a:solidFill>
+                <a:effectLst/>
+                <a:latin typeface="Calibri" panose="020F0502020204030204" pitchFamily="34" charset="0"/>
+              </a:rPr>
+              <a:t>by creating a delivery rather than creating a transient delivery session and then doing a GET+PUT on it</a:t>
             </a:r>
           </a:p>
           <a:p>
@@ -41846,7 +41866,7 @@
           <a:bodyPr/>
           <a:lstStyle/>
           <a:p>
-            <a:endParaRPr lang="en-US"/>
+            <a:endParaRPr lang="en-US" dirty="0"/>
           </a:p>
         </p:txBody>
       </p:sp>

</xml_diff>

<commit_message>
Jra change set delivery (#620)
* Added sections for change set delivery and history

These came from David Honey's proposal.

* Fixed value type errors from ShapeChecker

* Three more value type updates

* Fixed some issues in existing OASIS Standareds

QM was adding the revision to the OASIS Standard path name: os01 should have been os causing broken links. There are no revisions to standards.
trs-vcab.ttl was misspelled.

* Updated config to version 1.1 and created PSD in preparation for publishing

* Minor updates from reviews
</commit_message>
<xml_diff>
--- a/specs/config/Resources/OSLC change set delivery.pptx
+++ b/specs/config/Resources/OSLC change set delivery.pptx
@@ -222,7 +222,7 @@
           <a:p>
             <a:fld id="{AC64624D-466C-2042-8A0A-5AA56DE2DC64}" type="datetimeFigureOut">
               <a:rPr lang="en-US" smtClean="0"/>
-              <a:t>2/5/24</a:t>
+              <a:t>8/16/24</a:t>
             </a:fld>
             <a:endParaRPr lang="en-US" dirty="0"/>
           </a:p>
@@ -387,7 +387,7 @@
           <a:p>
             <a:fld id="{A760D7BC-41EB-DC45-939C-558E874D2743}" type="datetimeFigureOut">
               <a:rPr lang="en-US" smtClean="0"/>
-              <a:t>2/5/24</a:t>
+              <a:t>8/16/24</a:t>
             </a:fld>
             <a:endParaRPr lang="en-US" dirty="0"/>
           </a:p>
@@ -9905,7 +9905,7 @@
           <a:p>
             <a:fld id="{5D54C85F-E49F-4556-9C13-BAF2023328F7}" type="datetime1">
               <a:rPr lang="en-US" smtClean="0"/>
-              <a:t>2/5/24</a:t>
+              <a:t>8/16/24</a:t>
             </a:fld>
             <a:endParaRPr lang="en-US" dirty="0"/>
           </a:p>
@@ -10667,7 +10667,7 @@
           <a:p>
             <a:fld id="{96AFE3AB-9457-47E2-8F5A-309AE593D110}" type="datetime1">
               <a:rPr lang="en-US" smtClean="0"/>
-              <a:t>2/5/24</a:t>
+              <a:t>8/16/24</a:t>
             </a:fld>
             <a:endParaRPr lang="en-US" dirty="0"/>
           </a:p>
@@ -10968,7 +10968,7 @@
           <a:p>
             <a:fld id="{2674E2BE-0B60-42EC-99E3-1496BB98F673}" type="datetime1">
               <a:rPr lang="en-US" smtClean="0"/>
-              <a:t>2/5/24</a:t>
+              <a:t>8/16/24</a:t>
             </a:fld>
             <a:endParaRPr lang="en-US" dirty="0"/>
           </a:p>
@@ -11286,7 +11286,7 @@
           <a:p>
             <a:fld id="{5041C711-DA90-4286-A3E2-176F296CDBB6}" type="datetime1">
               <a:rPr lang="en-US" smtClean="0"/>
-              <a:t>2/5/24</a:t>
+              <a:t>8/16/24</a:t>
             </a:fld>
             <a:endParaRPr lang="en-US" dirty="0"/>
           </a:p>
@@ -11513,7 +11513,7 @@
           <a:p>
             <a:fld id="{AA52A885-0CA1-4F08-B373-9D4765BA07FF}" type="datetime1">
               <a:rPr lang="en-US" smtClean="0"/>
-              <a:t>2/5/24</a:t>
+              <a:t>8/16/24</a:t>
             </a:fld>
             <a:endParaRPr lang="en-US" dirty="0"/>
           </a:p>
@@ -11922,7 +11922,7 @@
           <a:p>
             <a:fld id="{1C8FD8CA-192E-4293-A4D2-891F0932AEDF}" type="datetime1">
               <a:rPr lang="en-US" smtClean="0"/>
-              <a:t>2/5/24</a:t>
+              <a:t>8/16/24</a:t>
             </a:fld>
             <a:endParaRPr lang="en-US" dirty="0"/>
           </a:p>
@@ -12066,7 +12066,7 @@
           <a:p>
             <a:fld id="{F6C5EABC-B859-4AFC-A225-1E2F4D4B4664}" type="datetime1">
               <a:rPr lang="en-US" smtClean="0"/>
-              <a:t>2/5/24</a:t>
+              <a:t>8/16/24</a:t>
             </a:fld>
             <a:endParaRPr lang="en-US" dirty="0"/>
           </a:p>
@@ -14922,7 +14922,7 @@
           <a:p>
             <a:fld id="{2674E2BE-0B60-42EC-99E3-1496BB98F673}" type="datetime1">
               <a:rPr lang="en-US" smtClean="0"/>
-              <a:t>2/5/24</a:t>
+              <a:t>8/16/24</a:t>
             </a:fld>
             <a:endParaRPr lang="en-US" dirty="0"/>
           </a:p>
@@ -17965,7 +17965,7 @@
           <a:p>
             <a:fld id="{F988DFB2-08C0-47EE-9E2D-C36FBBC14812}" type="datetime1">
               <a:rPr lang="en-US" smtClean="0"/>
-              <a:t>2/5/24</a:t>
+              <a:t>8/16/24</a:t>
             </a:fld>
             <a:endParaRPr lang="en-US" dirty="0"/>
           </a:p>
@@ -18335,7 +18335,7 @@
           <a:p>
             <a:fld id="{6AA09E7F-3822-4A7A-A3F2-AA6777F1B30F}" type="datetime1">
               <a:rPr lang="en-US" smtClean="0"/>
-              <a:t>2/5/24</a:t>
+              <a:t>8/16/24</a:t>
             </a:fld>
             <a:endParaRPr lang="en-US" dirty="0"/>
           </a:p>
@@ -18560,7 +18560,7 @@
           <a:p>
             <a:fld id="{1B003211-AD61-4E7C-9A84-FA9708692C37}" type="datetime1">
               <a:rPr lang="en-US" smtClean="0"/>
-              <a:t>2/5/24</a:t>
+              <a:t>8/16/24</a:t>
             </a:fld>
             <a:endParaRPr lang="en-US" dirty="0"/>
           </a:p>
@@ -18986,7 +18986,7 @@
           <a:p>
             <a:fld id="{B5C78C4C-056F-4AFF-BFF7-E831EDFABF3A}" type="datetime1">
               <a:rPr lang="en-US" smtClean="0"/>
-              <a:t>2/5/24</a:t>
+              <a:t>8/16/24</a:t>
             </a:fld>
             <a:endParaRPr lang="en-US" dirty="0"/>
           </a:p>
@@ -41753,7 +41753,27 @@
                 <a:effectLst/>
                 <a:latin typeface="Calibri" panose="020F0502020204030204" pitchFamily="34" charset="0"/>
               </a:rPr>
-              <a:t>delivery is effected by creating a delivery rather than creating a transient delivery session and then doing a GET+PUT on it</a:t>
+              <a:t>delivery </a:t>
+            </a:r>
+            <a:r>
+              <a:rPr lang="en-US" sz="1800" b="0" i="0" u="none" strike="noStrike">
+                <a:solidFill>
+                  <a:srgbClr val="000000"/>
+                </a:solidFill>
+                <a:effectLst/>
+                <a:latin typeface="Calibri" panose="020F0502020204030204" pitchFamily="34" charset="0"/>
+              </a:rPr>
+              <a:t>is affected </a:t>
+            </a:r>
+            <a:r>
+              <a:rPr lang="en-US" sz="1800" b="0" i="0" u="none" strike="noStrike" dirty="0">
+                <a:solidFill>
+                  <a:srgbClr val="000000"/>
+                </a:solidFill>
+                <a:effectLst/>
+                <a:latin typeface="Calibri" panose="020F0502020204030204" pitchFamily="34" charset="0"/>
+              </a:rPr>
+              <a:t>by creating a delivery rather than creating a transient delivery session and then doing a GET+PUT on it</a:t>
             </a:r>
           </a:p>
           <a:p>
@@ -41846,7 +41866,7 @@
           <a:bodyPr/>
           <a:lstStyle/>
           <a:p>
-            <a:endParaRPr lang="en-US"/>
+            <a:endParaRPr lang="en-US" dirty="0"/>
           </a:p>
         </p:txBody>
       </p:sp>

</xml_diff>